<commit_message>
task for next iter added
</commit_message>
<xml_diff>
--- a/Files/Iteration 1.pptx
+++ b/Files/Iteration 1.pptx
@@ -9886,7 +9886,7 @@
         </p:nvSpPr>
         <p:spPr>
           <a:xfrm>
-            <a:off x="107504" y="3913892"/>
+            <a:off x="107504" y="4175502"/>
             <a:ext cx="8784976" cy="523220"/>
           </a:xfrm>
           <a:prstGeom prst="rect">
@@ -9925,8 +9925,8 @@
         </p:nvSpPr>
         <p:spPr>
           <a:xfrm>
-            <a:off x="-31846" y="1196752"/>
-            <a:ext cx="8316416" cy="1754326"/>
+            <a:off x="4152" y="1196752"/>
+            <a:ext cx="8316416" cy="2862322"/>
           </a:xfrm>
           <a:prstGeom prst="rect">
             <a:avLst/>
@@ -9950,7 +9950,11 @@
             </a:r>
             <a:r>
               <a:rPr lang="en-US" sz="3600" b="1" dirty="0" smtClean="0"/>
-              <a:t>tasks……</a:t>
+              <a:t>tasks</a:t>
+            </a:r>
+            <a:r>
+              <a:rPr lang="en-US" sz="3600" b="1" dirty="0" smtClean="0"/>
+              <a:t>……</a:t>
             </a:r>
           </a:p>
           <a:p>
@@ -9960,8 +9964,9 @@
             </a:pPr>
             <a:r>
               <a:rPr lang="en-US" sz="3600" b="1" dirty="0" smtClean="0"/>
-              <a:t>Add a new course</a:t>
-            </a:r>
+              <a:t>Establish file server</a:t>
+            </a:r>
+            <a:endParaRPr lang="en-US" sz="3600" b="1" dirty="0" smtClean="0"/>
           </a:p>
           <a:p>
             <a:pPr marL="1485900" lvl="2" indent="-571500" algn="l">
@@ -9970,8 +9975,41 @@
             </a:pPr>
             <a:r>
               <a:rPr lang="en-US" sz="3600" b="1" dirty="0" smtClean="0"/>
-              <a:t>Invite other user to a course</a:t>
-            </a:r>
+              <a:t>Join </a:t>
+            </a:r>
+            <a:r>
+              <a:rPr lang="en-US" sz="3600" b="1" dirty="0"/>
+              <a:t>a new course</a:t>
+            </a:r>
+          </a:p>
+          <a:p>
+            <a:pPr marL="1485900" lvl="2" indent="-571500" algn="l">
+              <a:buFont typeface="Arial" pitchFamily="34" charset="0"/>
+              <a:buChar char="•"/>
+            </a:pPr>
+            <a:r>
+              <a:rPr lang="en-US" sz="3600" b="1" dirty="0"/>
+              <a:t>Invite other </a:t>
+            </a:r>
+            <a:r>
+              <a:rPr lang="en-US" sz="3600" b="1" dirty="0" smtClean="0"/>
+              <a:t>user to a </a:t>
+            </a:r>
+            <a:r>
+              <a:rPr lang="en-US" sz="3600" b="1" dirty="0" smtClean="0"/>
+              <a:t>course</a:t>
+            </a:r>
+          </a:p>
+          <a:p>
+            <a:pPr marL="1485900" lvl="2" indent="-571500" algn="l">
+              <a:buFont typeface="Arial" pitchFamily="34" charset="0"/>
+              <a:buChar char="•"/>
+            </a:pPr>
+            <a:r>
+              <a:rPr lang="en-US" sz="3600" b="1" dirty="0" smtClean="0"/>
+              <a:t>Login from Android</a:t>
+            </a:r>
+            <a:endParaRPr lang="en-US" sz="3600" b="1" dirty="0" smtClean="0"/>
           </a:p>
         </p:txBody>
       </p:sp>

</xml_diff>